<commit_message>
+ conclusion slide, + lmfit slide
</commit_message>
<xml_diff>
--- a/slides3.pptx
+++ b/slides3.pptx
@@ -5,7 +5,7 @@
     <p:sldMasterId id="2147483648" r:id="rId1"/>
   </p:sldMasterIdLst>
   <p:notesMasterIdLst>
-    <p:notesMasterId r:id="rId15"/>
+    <p:notesMasterId r:id="rId17"/>
   </p:notesMasterIdLst>
   <p:sldIdLst>
     <p:sldId id="271" r:id="rId2"/>
@@ -20,7 +20,9 @@
     <p:sldId id="286" r:id="rId11"/>
     <p:sldId id="280" r:id="rId12"/>
     <p:sldId id="281" r:id="rId13"/>
-    <p:sldId id="287" r:id="rId14"/>
+    <p:sldId id="288" r:id="rId14"/>
+    <p:sldId id="287" r:id="rId15"/>
+    <p:sldId id="289" r:id="rId16"/>
   </p:sldIdLst>
   <p:sldSz cx="12192000" cy="6858000"/>
   <p:notesSz cx="6858000" cy="9144000"/>
@@ -209,7 +211,7 @@
           <a:p>
             <a:fld id="{51EF012E-01B7-4BA4-8313-638E854A2AE5}" type="datetimeFigureOut">
               <a:rPr lang="he-IL" smtClean="0"/>
-              <a:t>ז'/אב/תשפ"ה</a:t>
+              <a:t>ח'/אב/תשפ"ה</a:t>
             </a:fld>
             <a:endParaRPr lang="he-IL"/>
           </a:p>
@@ -713,7 +715,7 @@
           <a:p>
             <a:fld id="{6E941FE1-24E3-44D6-A7AB-44791E971AE0}" type="slidenum">
               <a:rPr lang="he-IL" smtClean="0"/>
-              <a:t>13</a:t>
+              <a:t>14</a:t>
             </a:fld>
             <a:endParaRPr lang="he-IL"/>
           </a:p>
@@ -723,6 +725,119 @@
     <p:extLst>
       <p:ext uri="{BB962C8B-B14F-4D97-AF65-F5344CB8AC3E}">
         <p14:creationId xmlns:p14="http://schemas.microsoft.com/office/powerpoint/2010/main" val="1898217286"/>
+      </p:ext>
+    </p:extLst>
+  </p:cSld>
+  <p:clrMapOvr>
+    <a:masterClrMapping/>
+  </p:clrMapOvr>
+</p:notes>
+</file>
+
+<file path=ppt/notesSlides/notesSlide3.xml><?xml version="1.0" encoding="utf-8"?>
+<p:notes xmlns:a="http://schemas.openxmlformats.org/drawingml/2006/main" xmlns:r="http://schemas.openxmlformats.org/officeDocument/2006/relationships" xmlns:p="http://schemas.openxmlformats.org/presentationml/2006/main">
+  <p:cSld>
+    <p:spTree>
+      <p:nvGrpSpPr>
+        <p:cNvPr id="1" name="">
+          <a:extLst>
+            <a:ext uri="{FF2B5EF4-FFF2-40B4-BE49-F238E27FC236}">
+              <a16:creationId xmlns:a16="http://schemas.microsoft.com/office/drawing/2014/main" id="{E6AF61BF-F360-E024-FCD9-FE88C6C6F0E3}"/>
+            </a:ext>
+          </a:extLst>
+        </p:cNvPr>
+        <p:cNvGrpSpPr/>
+        <p:nvPr/>
+      </p:nvGrpSpPr>
+      <p:grpSpPr>
+        <a:xfrm>
+          <a:off x="0" y="0"/>
+          <a:ext cx="0" cy="0"/>
+          <a:chOff x="0" y="0"/>
+          <a:chExt cx="0" cy="0"/>
+        </a:xfrm>
+      </p:grpSpPr>
+      <p:sp>
+        <p:nvSpPr>
+          <p:cNvPr id="2" name="Slide Image Placeholder 1">
+            <a:extLst>
+              <a:ext uri="{FF2B5EF4-FFF2-40B4-BE49-F238E27FC236}">
+                <a16:creationId xmlns:a16="http://schemas.microsoft.com/office/drawing/2014/main" id="{8BF0FAE9-83F1-91C4-BE25-95F9012870B2}"/>
+              </a:ext>
+            </a:extLst>
+          </p:cNvPr>
+          <p:cNvSpPr>
+            <a:spLocks noGrp="1" noRot="1" noChangeAspect="1"/>
+          </p:cNvSpPr>
+          <p:nvPr>
+            <p:ph type="sldImg"/>
+          </p:nvPr>
+        </p:nvSpPr>
+        <p:spPr/>
+      </p:sp>
+      <p:sp>
+        <p:nvSpPr>
+          <p:cNvPr id="3" name="Notes Placeholder 2">
+            <a:extLst>
+              <a:ext uri="{FF2B5EF4-FFF2-40B4-BE49-F238E27FC236}">
+                <a16:creationId xmlns:a16="http://schemas.microsoft.com/office/drawing/2014/main" id="{04324647-BC13-C542-E95C-91435C518B0D}"/>
+              </a:ext>
+            </a:extLst>
+          </p:cNvPr>
+          <p:cNvSpPr>
+            <a:spLocks noGrp="1"/>
+          </p:cNvSpPr>
+          <p:nvPr>
+            <p:ph type="body" idx="1"/>
+          </p:nvPr>
+        </p:nvSpPr>
+        <p:spPr/>
+        <p:txBody>
+          <a:bodyPr/>
+          <a:lstStyle/>
+          <a:p>
+            <a:pPr algn="r" rtl="1"/>
+            <a:endParaRPr lang="he-IL" dirty="0"/>
+          </a:p>
+          <a:p>
+            <a:pPr algn="r" rtl="1"/>
+            <a:endParaRPr lang="ru-RU" dirty="0"/>
+          </a:p>
+        </p:txBody>
+      </p:sp>
+      <p:sp>
+        <p:nvSpPr>
+          <p:cNvPr id="4" name="Slide Number Placeholder 3">
+            <a:extLst>
+              <a:ext uri="{FF2B5EF4-FFF2-40B4-BE49-F238E27FC236}">
+                <a16:creationId xmlns:a16="http://schemas.microsoft.com/office/drawing/2014/main" id="{A3AAED4F-E806-8498-4BE6-33A1562252D2}"/>
+              </a:ext>
+            </a:extLst>
+          </p:cNvPr>
+          <p:cNvSpPr>
+            <a:spLocks noGrp="1"/>
+          </p:cNvSpPr>
+          <p:nvPr>
+            <p:ph type="sldNum" sz="quarter" idx="5"/>
+          </p:nvPr>
+        </p:nvSpPr>
+        <p:spPr/>
+        <p:txBody>
+          <a:bodyPr/>
+          <a:lstStyle/>
+          <a:p>
+            <a:fld id="{6E941FE1-24E3-44D6-A7AB-44791E971AE0}" type="slidenum">
+              <a:rPr lang="he-IL" smtClean="0"/>
+              <a:t>15</a:t>
+            </a:fld>
+            <a:endParaRPr lang="he-IL"/>
+          </a:p>
+        </p:txBody>
+      </p:sp>
+    </p:spTree>
+    <p:extLst>
+      <p:ext uri="{BB962C8B-B14F-4D97-AF65-F5344CB8AC3E}">
+        <p14:creationId xmlns:p14="http://schemas.microsoft.com/office/powerpoint/2010/main" val="1149862109"/>
       </p:ext>
     </p:extLst>
   </p:cSld>
@@ -881,7 +996,7 @@
           <a:p>
             <a:fld id="{5A65B266-99E8-40C4-82C1-8EEF5B958589}" type="datetime8">
               <a:rPr lang="he-IL" smtClean="0"/>
-              <a:t>01 אוגוסט 25</a:t>
+              <a:t>02 אוגוסט 25</a:t>
             </a:fld>
             <a:endParaRPr lang="he-IL"/>
           </a:p>
@@ -1081,7 +1196,7 @@
           <a:p>
             <a:fld id="{A3E438AD-1B3F-4717-B534-EC593A023400}" type="datetime8">
               <a:rPr lang="he-IL" smtClean="0"/>
-              <a:t>01 אוגוסט 25</a:t>
+              <a:t>02 אוגוסט 25</a:t>
             </a:fld>
             <a:endParaRPr lang="he-IL"/>
           </a:p>
@@ -1291,7 +1406,7 @@
           <a:p>
             <a:fld id="{F2EFCEB6-C1AE-40CA-A9DE-FC2748270423}" type="datetime8">
               <a:rPr lang="he-IL" smtClean="0"/>
-              <a:t>01 אוגוסט 25</a:t>
+              <a:t>02 אוגוסט 25</a:t>
             </a:fld>
             <a:endParaRPr lang="he-IL"/>
           </a:p>
@@ -1491,7 +1606,7 @@
           <a:p>
             <a:fld id="{E62D761F-5BF0-429F-92DD-37E5C39E3B71}" type="datetime8">
               <a:rPr lang="he-IL" smtClean="0"/>
-              <a:t>01 אוגוסט 25</a:t>
+              <a:t>02 אוגוסט 25</a:t>
             </a:fld>
             <a:endParaRPr lang="he-IL"/>
           </a:p>
@@ -1767,7 +1882,7 @@
           <a:p>
             <a:fld id="{C8BABE69-AF4A-47F3-BF81-8E299B597966}" type="datetime8">
               <a:rPr lang="he-IL" smtClean="0"/>
-              <a:t>01 אוגוסט 25</a:t>
+              <a:t>02 אוגוסט 25</a:t>
             </a:fld>
             <a:endParaRPr lang="he-IL"/>
           </a:p>
@@ -2035,7 +2150,7 @@
           <a:p>
             <a:fld id="{7DADBC9E-339C-4834-886E-D2DD630EE08D}" type="datetime8">
               <a:rPr lang="he-IL" smtClean="0"/>
-              <a:t>01 אוגוסט 25</a:t>
+              <a:t>02 אוגוסט 25</a:t>
             </a:fld>
             <a:endParaRPr lang="he-IL"/>
           </a:p>
@@ -2450,7 +2565,7 @@
           <a:p>
             <a:fld id="{576C7171-4D5D-418F-B13A-F2E7914D8881}" type="datetime8">
               <a:rPr lang="he-IL" smtClean="0"/>
-              <a:t>01 אוגוסט 25</a:t>
+              <a:t>02 אוגוסט 25</a:t>
             </a:fld>
             <a:endParaRPr lang="he-IL"/>
           </a:p>
@@ -2592,7 +2707,7 @@
           <a:p>
             <a:fld id="{B8593D32-9FF8-4607-8317-E049FBC543A7}" type="datetime8">
               <a:rPr lang="he-IL" smtClean="0"/>
-              <a:t>01 אוגוסט 25</a:t>
+              <a:t>02 אוגוסט 25</a:t>
             </a:fld>
             <a:endParaRPr lang="he-IL"/>
           </a:p>
@@ -2705,7 +2820,7 @@
           <a:p>
             <a:fld id="{34440BD4-6661-4491-8CC8-9BDA31781346}" type="datetime8">
               <a:rPr lang="he-IL" smtClean="0"/>
-              <a:t>01 אוגוסט 25</a:t>
+              <a:t>02 אוגוסט 25</a:t>
             </a:fld>
             <a:endParaRPr lang="he-IL"/>
           </a:p>
@@ -3018,7 +3133,7 @@
           <a:p>
             <a:fld id="{5E0CB808-4409-4137-B029-0CD5879BF914}" type="datetime8">
               <a:rPr lang="he-IL" smtClean="0"/>
-              <a:t>01 אוגוסט 25</a:t>
+              <a:t>02 אוגוסט 25</a:t>
             </a:fld>
             <a:endParaRPr lang="he-IL"/>
           </a:p>
@@ -3307,7 +3422,7 @@
           <a:p>
             <a:fld id="{DF2C78B8-194A-4F8E-BB31-8F8AE0C5E245}" type="datetime8">
               <a:rPr lang="he-IL" smtClean="0"/>
-              <a:t>01 אוגוסט 25</a:t>
+              <a:t>02 אוגוסט 25</a:t>
             </a:fld>
             <a:endParaRPr lang="he-IL"/>
           </a:p>
@@ -3550,7 +3665,7 @@
           <a:p>
             <a:fld id="{6D6E90AE-B598-4C6A-B306-E0DD72A75DB8}" type="datetime8">
               <a:rPr lang="he-IL" smtClean="0"/>
-              <a:t>01 אוגוסט 25</a:t>
+              <a:t>02 אוגוסט 25</a:t>
             </a:fld>
             <a:endParaRPr lang="he-IL"/>
           </a:p>
@@ -5074,8 +5189,8 @@
         </p:nvSpPr>
         <p:spPr>
           <a:xfrm>
-            <a:off x="3151294" y="195333"/>
-            <a:ext cx="6258445" cy="707886"/>
+            <a:off x="3750612" y="263664"/>
+            <a:ext cx="5036956" cy="707886"/>
           </a:xfrm>
           <a:prstGeom prst="rect">
             <a:avLst/>
@@ -5093,63 +5208,17 @@
               <a:rPr lang="he-IL" sz="4000" dirty="0">
                 <a:cs typeface="Arial"/>
               </a:rPr>
-              <a:t>התאמה גלובאלית  נגד מקומית</a:t>
-            </a:r>
-          </a:p>
-        </p:txBody>
-      </p:sp>
-      <p:sp>
-        <p:nvSpPr>
-          <p:cNvPr id="7" name="TextBox 6">
-            <a:extLst>
-              <a:ext uri="{FF2B5EF4-FFF2-40B4-BE49-F238E27FC236}">
-                <a16:creationId xmlns:a16="http://schemas.microsoft.com/office/drawing/2014/main" id="{117378C2-F1AA-DD70-F00C-3AD4B361C9B2}"/>
-              </a:ext>
-            </a:extLst>
-          </p:cNvPr>
-          <p:cNvSpPr txBox="1"/>
-          <p:nvPr/>
-        </p:nvSpPr>
-        <p:spPr>
-          <a:xfrm>
-            <a:off x="657922" y="6350852"/>
-            <a:ext cx="6844694" cy="276999"/>
-          </a:xfrm>
-          <a:prstGeom prst="rect">
-            <a:avLst/>
-          </a:prstGeom>
-          <a:noFill/>
-        </p:spPr>
-        <p:txBody>
-          <a:bodyPr wrap="none" rtlCol="0">
-            <a:spAutoFit/>
-          </a:bodyPr>
-          <a:lstStyle/>
-          <a:p>
-            <a:r>
-              <a:rPr lang="en-US" sz="1200" dirty="0" err="1"/>
-              <a:t>Codesnippet</a:t>
-            </a:r>
-            <a:r>
-              <a:rPr lang="en-US" sz="1200" dirty="0"/>
-              <a:t> </a:t>
-            </a:r>
-            <a:r>
-              <a:rPr lang="en-US" sz="1200" dirty="0">
-                <a:hlinkClick r:id="rId2"/>
-              </a:rPr>
-              <a:t>https://github.com/evgeny-kolonsky/summer_seminar/blob/main/Global_optimization.ipynb</a:t>
-            </a:r>
-            <a:endParaRPr lang="ru-RU" sz="1200" dirty="0"/>
+              <a:t>התאמה זו חיפוש מינימה</a:t>
+            </a:r>
           </a:p>
         </p:txBody>
       </p:sp>
       <p:pic>
         <p:nvPicPr>
-          <p:cNvPr id="13316" name="Picture 4">
-            <a:extLst>
-              <a:ext uri="{FF2B5EF4-FFF2-40B4-BE49-F238E27FC236}">
-                <a16:creationId xmlns:a16="http://schemas.microsoft.com/office/drawing/2014/main" id="{95319323-40C2-DF2C-60FB-FC94704CFFA9}"/>
+          <p:cNvPr id="1026" name="Picture 2">
+            <a:extLst>
+              <a:ext uri="{FF2B5EF4-FFF2-40B4-BE49-F238E27FC236}">
+                <a16:creationId xmlns:a16="http://schemas.microsoft.com/office/drawing/2014/main" id="{B845EE37-375F-746D-6BBF-8878DAE43799}"/>
               </a:ext>
             </a:extLst>
           </p:cNvPr>
@@ -5159,7 +5228,7 @@
           <p:nvPr/>
         </p:nvPicPr>
         <p:blipFill>
-          <a:blip r:embed="rId3">
+          <a:blip r:embed="rId2">
             <a:extLst>
               <a:ext uri="{28A0092B-C50C-407E-A947-70E740481C1C}">
                 <a14:useLocalDpi xmlns:a14="http://schemas.microsoft.com/office/drawing/2010/main" val="0"/>
@@ -5173,8 +5242,8 @@
         </p:blipFill>
         <p:spPr bwMode="auto">
           <a:xfrm>
-            <a:off x="3162446" y="1401128"/>
-            <a:ext cx="5867108" cy="4485322"/>
+            <a:off x="2943911" y="1481138"/>
+            <a:ext cx="6304178" cy="4819456"/>
           </a:xfrm>
           <a:prstGeom prst="rect">
             <a:avLst/>
@@ -5226,6 +5295,176 @@
           <p:cNvPr id="2" name="Slide Number Placeholder 1">
             <a:extLst>
               <a:ext uri="{FF2B5EF4-FFF2-40B4-BE49-F238E27FC236}">
+                <a16:creationId xmlns:a16="http://schemas.microsoft.com/office/drawing/2014/main" id="{F40B969A-5E1F-2A5A-DF0E-5155C8216152}"/>
+              </a:ext>
+            </a:extLst>
+          </p:cNvPr>
+          <p:cNvSpPr>
+            <a:spLocks noGrp="1"/>
+          </p:cNvSpPr>
+          <p:nvPr>
+            <p:ph type="sldNum" sz="quarter" idx="12"/>
+          </p:nvPr>
+        </p:nvSpPr>
+        <p:spPr>
+          <a:xfrm>
+            <a:off x="10927080" y="6356350"/>
+            <a:ext cx="426720" cy="398780"/>
+          </a:xfrm>
+        </p:spPr>
+        <p:txBody>
+          <a:bodyPr/>
+          <a:lstStyle/>
+          <a:p>
+            <a:fld id="{A263F1A8-BC7B-4008-A955-96F8F4A3B8CB}" type="slidenum">
+              <a:rPr lang="he-IL" smtClean="0"/>
+              <a:t>13</a:t>
+            </a:fld>
+            <a:endParaRPr lang="he-IL" dirty="0"/>
+          </a:p>
+        </p:txBody>
+      </p:sp>
+      <p:sp>
+        <p:nvSpPr>
+          <p:cNvPr id="7" name="TextBox 6">
+            <a:extLst>
+              <a:ext uri="{FF2B5EF4-FFF2-40B4-BE49-F238E27FC236}">
+                <a16:creationId xmlns:a16="http://schemas.microsoft.com/office/drawing/2014/main" id="{117378C2-F1AA-DD70-F00C-3AD4B361C9B2}"/>
+              </a:ext>
+            </a:extLst>
+          </p:cNvPr>
+          <p:cNvSpPr txBox="1"/>
+          <p:nvPr/>
+        </p:nvSpPr>
+        <p:spPr>
+          <a:xfrm>
+            <a:off x="365438" y="6417240"/>
+            <a:ext cx="6024791" cy="276999"/>
+          </a:xfrm>
+          <a:prstGeom prst="rect">
+            <a:avLst/>
+          </a:prstGeom>
+          <a:noFill/>
+        </p:spPr>
+        <p:txBody>
+          <a:bodyPr wrap="none" rtlCol="0">
+            <a:spAutoFit/>
+          </a:bodyPr>
+          <a:lstStyle/>
+          <a:p>
+            <a:r>
+              <a:rPr lang="en-US" sz="1200" dirty="0">
+                <a:hlinkClick r:id="rId2"/>
+              </a:rPr>
+              <a:t>https://github.com/evgeny-kolonsky/summer_seminar/blob/main/Global_optimization.ipynb</a:t>
+            </a:r>
+            <a:endParaRPr lang="ru-RU" sz="1200" dirty="0"/>
+          </a:p>
+        </p:txBody>
+      </p:sp>
+      <p:pic>
+        <p:nvPicPr>
+          <p:cNvPr id="9" name="Picture 8">
+            <a:extLst>
+              <a:ext uri="{FF2B5EF4-FFF2-40B4-BE49-F238E27FC236}">
+                <a16:creationId xmlns:a16="http://schemas.microsoft.com/office/drawing/2014/main" id="{1F060017-5674-72C4-B623-9C29D2D1009E}"/>
+              </a:ext>
+            </a:extLst>
+          </p:cNvPr>
+          <p:cNvPicPr>
+            <a:picLocks noChangeAspect="1"/>
+          </p:cNvPicPr>
+          <p:nvPr/>
+        </p:nvPicPr>
+        <p:blipFill>
+          <a:blip r:embed="rId3"/>
+          <a:stretch>
+            <a:fillRect/>
+          </a:stretch>
+        </p:blipFill>
+        <p:spPr>
+          <a:xfrm>
+            <a:off x="2594343" y="1401887"/>
+            <a:ext cx="6157494" cy="4442845"/>
+          </a:xfrm>
+          <a:prstGeom prst="rect">
+            <a:avLst/>
+          </a:prstGeom>
+        </p:spPr>
+      </p:pic>
+      <p:sp>
+        <p:nvSpPr>
+          <p:cNvPr id="10" name="TextBox 9">
+            <a:extLst>
+              <a:ext uri="{FF2B5EF4-FFF2-40B4-BE49-F238E27FC236}">
+                <a16:creationId xmlns:a16="http://schemas.microsoft.com/office/drawing/2014/main" id="{0F158DB5-3CB6-754A-3138-6C9BC4FCFD08}"/>
+              </a:ext>
+            </a:extLst>
+          </p:cNvPr>
+          <p:cNvSpPr txBox="1"/>
+          <p:nvPr/>
+        </p:nvSpPr>
+        <p:spPr>
+          <a:xfrm>
+            <a:off x="4473085" y="305382"/>
+            <a:ext cx="2400016" cy="707886"/>
+          </a:xfrm>
+          <a:prstGeom prst="rect">
+            <a:avLst/>
+          </a:prstGeom>
+          <a:noFill/>
+        </p:spPr>
+        <p:txBody>
+          <a:bodyPr wrap="none" lIns="91440" tIns="45720" rIns="91440" bIns="45720" rtlCol="1" anchor="t">
+            <a:spAutoFit/>
+          </a:bodyPr>
+          <a:lstStyle/>
+          <a:p>
+            <a:pPr algn="ctr"/>
+            <a:r>
+              <a:rPr lang="he-IL" sz="4000" dirty="0">
+                <a:cs typeface="Arial"/>
+              </a:rPr>
+              <a:t>חתיחת קוד</a:t>
+            </a:r>
+          </a:p>
+        </p:txBody>
+      </p:sp>
+    </p:spTree>
+    <p:extLst>
+      <p:ext uri="{BB962C8B-B14F-4D97-AF65-F5344CB8AC3E}">
+        <p14:creationId xmlns:p14="http://schemas.microsoft.com/office/powerpoint/2010/main" val="3733646641"/>
+      </p:ext>
+    </p:extLst>
+  </p:cSld>
+  <p:clrMapOvr>
+    <a:masterClrMapping/>
+  </p:clrMapOvr>
+</p:sld>
+</file>
+
+<file path=ppt/slides/slide14.xml><?xml version="1.0" encoding="utf-8"?>
+<p:sld xmlns:a="http://schemas.openxmlformats.org/drawingml/2006/main" xmlns:r="http://schemas.openxmlformats.org/officeDocument/2006/relationships" xmlns:p="http://schemas.openxmlformats.org/presentationml/2006/main">
+  <p:cSld>
+    <p:spTree>
+      <p:nvGrpSpPr>
+        <p:cNvPr id="1" name=""/>
+        <p:cNvGrpSpPr/>
+        <p:nvPr/>
+      </p:nvGrpSpPr>
+      <p:grpSpPr>
+        <a:xfrm>
+          <a:off x="0" y="0"/>
+          <a:ext cx="0" cy="0"/>
+          <a:chOff x="0" y="0"/>
+          <a:chExt cx="0" cy="0"/>
+        </a:xfrm>
+      </p:grpSpPr>
+      <p:sp>
+        <p:nvSpPr>
+          <p:cNvPr id="2" name="Slide Number Placeholder 1">
+            <a:extLst>
+              <a:ext uri="{FF2B5EF4-FFF2-40B4-BE49-F238E27FC236}">
                 <a16:creationId xmlns:a16="http://schemas.microsoft.com/office/drawing/2014/main" id="{9F6C4DC4-0C99-06F3-A806-274260D21F29}"/>
               </a:ext>
             </a:extLst>
@@ -5249,7 +5488,7 @@
           <a:p>
             <a:fld id="{A263F1A8-BC7B-4008-A955-96F8F4A3B8CB}" type="slidenum">
               <a:rPr lang="he-IL" smtClean="0"/>
-              <a:t>13</a:t>
+              <a:t>14</a:t>
             </a:fld>
             <a:endParaRPr lang="he-IL" dirty="0"/>
           </a:p>
@@ -5293,12 +5532,295 @@
           </a:p>
         </p:txBody>
       </p:sp>
+      <p:sp>
+        <p:nvSpPr>
+          <p:cNvPr id="12" name="TextBox 11">
+            <a:extLst>
+              <a:ext uri="{FF2B5EF4-FFF2-40B4-BE49-F238E27FC236}">
+                <a16:creationId xmlns:a16="http://schemas.microsoft.com/office/drawing/2014/main" id="{E4756570-2641-DBE1-767C-AD473F561D3D}"/>
+              </a:ext>
+            </a:extLst>
+          </p:cNvPr>
+          <p:cNvSpPr txBox="1"/>
+          <p:nvPr/>
+        </p:nvSpPr>
+        <p:spPr>
+          <a:xfrm>
+            <a:off x="7602158" y="2005429"/>
+            <a:ext cx="3172522" cy="646331"/>
+          </a:xfrm>
+          <a:prstGeom prst="rect">
+            <a:avLst/>
+          </a:prstGeom>
+          <a:noFill/>
+          <a:ln>
+            <a:noFill/>
+          </a:ln>
+          <a:effectLst/>
+          <a:scene3d>
+            <a:camera prst="orthographicFront"/>
+            <a:lightRig rig="threePt" dir="t"/>
+          </a:scene3d>
+          <a:sp3d>
+            <a:bevelT/>
+          </a:sp3d>
+        </p:spPr>
+        <p:txBody>
+          <a:bodyPr wrap="square" rtlCol="0">
+            <a:spAutoFit/>
+          </a:bodyPr>
+          <a:lstStyle/>
+          <a:p>
+            <a:pPr algn="r" rtl="1"/>
+            <a:r>
+              <a:rPr lang="he-IL" sz="3600" dirty="0"/>
+              <a:t>רגרסיה לינארית</a:t>
+            </a:r>
+            <a:endParaRPr lang="ru-RU" sz="3600" dirty="0"/>
+          </a:p>
+        </p:txBody>
+      </p:sp>
+      <p:sp>
+        <p:nvSpPr>
+          <p:cNvPr id="13" name="TextBox 12">
+            <a:extLst>
+              <a:ext uri="{FF2B5EF4-FFF2-40B4-BE49-F238E27FC236}">
+                <a16:creationId xmlns:a16="http://schemas.microsoft.com/office/drawing/2014/main" id="{BE646262-20B6-CB43-48EA-5D0CDCD3D1F7}"/>
+              </a:ext>
+            </a:extLst>
+          </p:cNvPr>
+          <p:cNvSpPr txBox="1"/>
+          <p:nvPr/>
+        </p:nvSpPr>
+        <p:spPr>
+          <a:xfrm>
+            <a:off x="1417320" y="2005429"/>
+            <a:ext cx="3863340" cy="646331"/>
+          </a:xfrm>
+          <a:prstGeom prst="rect">
+            <a:avLst/>
+          </a:prstGeom>
+          <a:noFill/>
+          <a:ln>
+            <a:noFill/>
+          </a:ln>
+          <a:effectLst/>
+          <a:scene3d>
+            <a:camera prst="orthographicFront"/>
+            <a:lightRig rig="threePt" dir="t"/>
+          </a:scene3d>
+          <a:sp3d>
+            <a:bevelT/>
+          </a:sp3d>
+        </p:spPr>
+        <p:txBody>
+          <a:bodyPr wrap="square" rtlCol="0">
+            <a:spAutoFit/>
+          </a:bodyPr>
+          <a:lstStyle/>
+          <a:p>
+            <a:pPr algn="r" rtl="1"/>
+            <a:r>
+              <a:rPr lang="he-IL" sz="3600" dirty="0"/>
+              <a:t>התאמה לא לינארית</a:t>
+            </a:r>
+          </a:p>
+        </p:txBody>
+      </p:sp>
+      <p:pic>
+        <p:nvPicPr>
+          <p:cNvPr id="15" name="Picture 14">
+            <a:extLst>
+              <a:ext uri="{FF2B5EF4-FFF2-40B4-BE49-F238E27FC236}">
+                <a16:creationId xmlns:a16="http://schemas.microsoft.com/office/drawing/2014/main" id="{F6ED850D-081E-5DDD-21DA-5C6EFAA003BB}"/>
+              </a:ext>
+            </a:extLst>
+          </p:cNvPr>
+          <p:cNvPicPr>
+            <a:picLocks noChangeAspect="1"/>
+          </p:cNvPicPr>
+          <p:nvPr/>
+        </p:nvPicPr>
+        <p:blipFill>
+          <a:blip r:embed="rId3"/>
+          <a:stretch>
+            <a:fillRect/>
+          </a:stretch>
+        </p:blipFill>
+        <p:spPr>
+          <a:xfrm>
+            <a:off x="2034356" y="2788848"/>
+            <a:ext cx="2629267" cy="1028844"/>
+          </a:xfrm>
+          <a:prstGeom prst="rect">
+            <a:avLst/>
+          </a:prstGeom>
+          <a:ln>
+            <a:noFill/>
+          </a:ln>
+          <a:effectLst>
+            <a:outerShdw blurRad="190500" algn="tl" rotWithShape="0">
+              <a:srgbClr val="000000">
+                <a:alpha val="70000"/>
+              </a:srgbClr>
+            </a:outerShdw>
+          </a:effectLst>
+        </p:spPr>
+      </p:pic>
+      <p:pic>
+        <p:nvPicPr>
+          <p:cNvPr id="17" name="Picture 16">
+            <a:extLst>
+              <a:ext uri="{FF2B5EF4-FFF2-40B4-BE49-F238E27FC236}">
+                <a16:creationId xmlns:a16="http://schemas.microsoft.com/office/drawing/2014/main" id="{586B9AE4-AF4D-DEBE-75F0-A88B6EEB9FB7}"/>
+              </a:ext>
+            </a:extLst>
+          </p:cNvPr>
+          <p:cNvPicPr>
+            <a:picLocks noChangeAspect="1"/>
+          </p:cNvPicPr>
+          <p:nvPr/>
+        </p:nvPicPr>
+        <p:blipFill>
+          <a:blip r:embed="rId4"/>
+          <a:stretch>
+            <a:fillRect/>
+          </a:stretch>
+        </p:blipFill>
+        <p:spPr>
+          <a:xfrm>
+            <a:off x="7759469" y="2788848"/>
+            <a:ext cx="2857899" cy="1019317"/>
+          </a:xfrm>
+          <a:prstGeom prst="rect">
+            <a:avLst/>
+          </a:prstGeom>
+          <a:ln>
+            <a:noFill/>
+          </a:ln>
+          <a:effectLst>
+            <a:outerShdw blurRad="190500" algn="tl" rotWithShape="0">
+              <a:srgbClr val="000000">
+                <a:alpha val="70000"/>
+              </a:srgbClr>
+            </a:outerShdw>
+          </a:effectLst>
+        </p:spPr>
+      </p:pic>
+    </p:spTree>
+    <p:extLst>
+      <p:ext uri="{BB962C8B-B14F-4D97-AF65-F5344CB8AC3E}">
+        <p14:creationId xmlns:p14="http://schemas.microsoft.com/office/powerpoint/2010/main" val="3999945702"/>
+      </p:ext>
+    </p:extLst>
+  </p:cSld>
+  <p:clrMapOvr>
+    <a:masterClrMapping/>
+  </p:clrMapOvr>
+</p:sld>
+</file>
+
+<file path=ppt/slides/slide15.xml><?xml version="1.0" encoding="utf-8"?>
+<p:sld xmlns:a="http://schemas.openxmlformats.org/drawingml/2006/main" xmlns:r="http://schemas.openxmlformats.org/officeDocument/2006/relationships" xmlns:p="http://schemas.openxmlformats.org/presentationml/2006/main">
+  <p:cSld>
+    <p:spTree>
+      <p:nvGrpSpPr>
+        <p:cNvPr id="1" name="">
+          <a:extLst>
+            <a:ext uri="{FF2B5EF4-FFF2-40B4-BE49-F238E27FC236}">
+              <a16:creationId xmlns:a16="http://schemas.microsoft.com/office/drawing/2014/main" id="{007940C7-139E-40C3-350E-31230407271A}"/>
+            </a:ext>
+          </a:extLst>
+        </p:cNvPr>
+        <p:cNvGrpSpPr/>
+        <p:nvPr/>
+      </p:nvGrpSpPr>
+      <p:grpSpPr>
+        <a:xfrm>
+          <a:off x="0" y="0"/>
+          <a:ext cx="0" cy="0"/>
+          <a:chOff x="0" y="0"/>
+          <a:chExt cx="0" cy="0"/>
+        </a:xfrm>
+      </p:grpSpPr>
+      <p:sp>
+        <p:nvSpPr>
+          <p:cNvPr id="2" name="Slide Number Placeholder 1">
+            <a:extLst>
+              <a:ext uri="{FF2B5EF4-FFF2-40B4-BE49-F238E27FC236}">
+                <a16:creationId xmlns:a16="http://schemas.microsoft.com/office/drawing/2014/main" id="{A8B12FCA-FBB4-4C6D-DA08-C64272C28882}"/>
+              </a:ext>
+            </a:extLst>
+          </p:cNvPr>
+          <p:cNvSpPr>
+            <a:spLocks noGrp="1"/>
+          </p:cNvSpPr>
+          <p:nvPr>
+            <p:ph type="sldNum" sz="quarter" idx="12"/>
+          </p:nvPr>
+        </p:nvSpPr>
+        <p:spPr>
+          <a:xfrm>
+            <a:off x="10915650" y="6356350"/>
+            <a:ext cx="438150" cy="375920"/>
+          </a:xfrm>
+        </p:spPr>
+        <p:txBody>
+          <a:bodyPr/>
+          <a:lstStyle/>
+          <a:p>
+            <a:fld id="{A263F1A8-BC7B-4008-A955-96F8F4A3B8CB}" type="slidenum">
+              <a:rPr lang="he-IL" smtClean="0"/>
+              <a:t>15</a:t>
+            </a:fld>
+            <a:endParaRPr lang="he-IL" dirty="0"/>
+          </a:p>
+        </p:txBody>
+      </p:sp>
+      <p:sp>
+        <p:nvSpPr>
+          <p:cNvPr id="3" name="TextBox 2">
+            <a:extLst>
+              <a:ext uri="{FF2B5EF4-FFF2-40B4-BE49-F238E27FC236}">
+                <a16:creationId xmlns:a16="http://schemas.microsoft.com/office/drawing/2014/main" id="{48A23FC3-24CC-4B18-2C61-2D6A530C1519}"/>
+              </a:ext>
+            </a:extLst>
+          </p:cNvPr>
+          <p:cNvSpPr txBox="1"/>
+          <p:nvPr/>
+        </p:nvSpPr>
+        <p:spPr>
+          <a:xfrm>
+            <a:off x="5558480" y="462963"/>
+            <a:ext cx="1354859" cy="707886"/>
+          </a:xfrm>
+          <a:prstGeom prst="rect">
+            <a:avLst/>
+          </a:prstGeom>
+          <a:noFill/>
+        </p:spPr>
+        <p:txBody>
+          <a:bodyPr wrap="none" lIns="91440" tIns="45720" rIns="91440" bIns="45720" rtlCol="1" anchor="t">
+            <a:spAutoFit/>
+          </a:bodyPr>
+          <a:lstStyle/>
+          <a:p>
+            <a:pPr algn="ctr"/>
+            <a:r>
+              <a:rPr lang="he-IL" sz="4000" dirty="0">
+                <a:cs typeface="Arial"/>
+              </a:rPr>
+              <a:t>תודה!</a:t>
+            </a:r>
+          </a:p>
+        </p:txBody>
+      </p:sp>
       <p:pic>
         <p:nvPicPr>
           <p:cNvPr id="14340" name="Picture 4">
             <a:extLst>
               <a:ext uri="{FF2B5EF4-FFF2-40B4-BE49-F238E27FC236}">
-                <a16:creationId xmlns:a16="http://schemas.microsoft.com/office/drawing/2014/main" id="{FA4EE6B3-8B10-EEDF-A291-3114DAAC7C3C}"/>
+                <a16:creationId xmlns:a16="http://schemas.microsoft.com/office/drawing/2014/main" id="{F30D9427-EB59-1E97-C2DA-556391CD2B7A}"/>
               </a:ext>
             </a:extLst>
           </p:cNvPr>
@@ -5345,7 +5867,7 @@
           <p:cNvPr id="7" name="TextBox 6">
             <a:extLst>
               <a:ext uri="{FF2B5EF4-FFF2-40B4-BE49-F238E27FC236}">
-                <a16:creationId xmlns:a16="http://schemas.microsoft.com/office/drawing/2014/main" id="{FEFD89DD-D164-F036-8843-08F8D46335FF}"/>
+                <a16:creationId xmlns:a16="http://schemas.microsoft.com/office/drawing/2014/main" id="{C848BD97-C9AB-6A9A-AFD1-CA7C567A89E0}"/>
               </a:ext>
             </a:extLst>
           </p:cNvPr>
@@ -5386,7 +5908,7 @@
           <p:cNvPr id="9" name="TextBox 8">
             <a:extLst>
               <a:ext uri="{FF2B5EF4-FFF2-40B4-BE49-F238E27FC236}">
-                <a16:creationId xmlns:a16="http://schemas.microsoft.com/office/drawing/2014/main" id="{5D53AAFE-DF2B-546E-CC3A-33F7D297D602}"/>
+                <a16:creationId xmlns:a16="http://schemas.microsoft.com/office/drawing/2014/main" id="{09D95960-47AC-A77B-F701-4B15329314A2}"/>
               </a:ext>
             </a:extLst>
           </p:cNvPr>
@@ -5429,7 +5951,7 @@
     </p:spTree>
     <p:extLst>
       <p:ext uri="{BB962C8B-B14F-4D97-AF65-F5344CB8AC3E}">
-        <p14:creationId xmlns:p14="http://schemas.microsoft.com/office/powerpoint/2010/main" val="3999945702"/>
+        <p14:creationId xmlns:p14="http://schemas.microsoft.com/office/powerpoint/2010/main" val="1484605893"/>
       </p:ext>
     </p:extLst>
   </p:cSld>

</xml_diff>